<commit_message>
Final pamphlet (pptx version)
</commit_message>
<xml_diff>
--- a/deliverables/Release 2/Poster.pptx
+++ b/deliverables/Release 2/Poster.pptx
@@ -219,8 +219,17 @@
 
 <file path=ppt/charts/chart1.xml><?xml version="1.0" encoding="utf-8"?>
 <c:chartSpace xmlns:c="http://schemas.openxmlformats.org/drawingml/2006/chart" xmlns:a="http://schemas.openxmlformats.org/drawingml/2006/main" xmlns:r="http://schemas.openxmlformats.org/officeDocument/2006/relationships">
-  <c:date1904 val="1"/>
+  <c:date1904 val="0"/>
   <c:lang val="en-US"/>
+  <c:roundedCorners val="0"/>
+  <mc:AlternateContent xmlns:mc="http://schemas.openxmlformats.org/markup-compatibility/2006">
+    <mc:Choice xmlns:c14="http://schemas.microsoft.com/office/drawing/2007/8/2/chart" Requires="c14">
+      <c14:style val="102"/>
+    </mc:Choice>
+    <mc:Fallback>
+      <c:style val="2"/>
+    </mc:Fallback>
+  </mc:AlternateContent>
   <c:clrMapOvr bg1="lt1" tx1="dk1" bg2="lt2" tx2="dk2" accent1="accent1" accent2="accent2" accent3="accent3" accent4="accent4" accent5="accent5" accent6="accent6" hlink="hlink" folHlink="folHlink"/>
   <c:chart>
     <c:title>
@@ -243,16 +252,19 @@
         <c:manualLayout>
           <c:xMode val="edge"/>
           <c:yMode val="edge"/>
-          <c:x val="0.47233101233903224"/>
-          <c:y val="8.9531680440771352E-2"/>
+          <c:x val="0.47233101233903202"/>
+          <c:y val="8.9531680440771297E-2"/>
         </c:manualLayout>
       </c:layout>
+      <c:overlay val="0"/>
     </c:title>
+    <c:autoTitleDeleted val="0"/>
     <c:plotArea>
       <c:layout/>
       <c:barChart>
         <c:barDir val="col"/>
         <c:grouping val="clustered"/>
+        <c:varyColors val="0"/>
         <c:ser>
           <c:idx val="0"/>
           <c:order val="0"/>
@@ -267,6 +279,7 @@
               </c:strCache>
             </c:strRef>
           </c:tx>
+          <c:invertIfNegative val="0"/>
           <c:cat>
             <c:strRef>
               <c:f>Graphs!$O$2:$R$2</c:f>
@@ -328,6 +341,7 @@
               <a:srgbClr val="92D050"/>
             </a:solidFill>
           </c:spPr>
+          <c:invertIfNegative val="0"/>
           <c:cat>
             <c:strRef>
               <c:f>Graphs!$O$2:$R$2</c:f>
@@ -391,6 +405,7 @@
               </a:schemeClr>
             </a:solidFill>
           </c:spPr>
+          <c:invertIfNegative val="0"/>
           <c:cat>
             <c:strRef>
               <c:f>Graphs!$O$2:$R$2</c:f>
@@ -449,11 +464,10 @@
           </c:tx>
           <c:spPr>
             <a:solidFill>
-              <a:schemeClr val="bg1">
-                <a:lumMod val="65000"/>
-              </a:schemeClr>
+              <a:srgbClr val="8F45C7"/>
             </a:solidFill>
           </c:spPr>
+          <c:invertIfNegative val="0"/>
           <c:cat>
             <c:strRef>
               <c:f>Graphs!$O$2:$R$2</c:f>
@@ -496,15 +510,27 @@
             </c:numRef>
           </c:val>
         </c:ser>
-        <c:axId val="56896128"/>
-        <c:axId val="56903168"/>
+        <c:dLbls>
+          <c:showLegendKey val="0"/>
+          <c:showVal val="0"/>
+          <c:showCatName val="0"/>
+          <c:showSerName val="0"/>
+          <c:showPercent val="0"/>
+          <c:showBubbleSize val="0"/>
+        </c:dLbls>
+        <c:gapWidth val="150"/>
+        <c:axId val="60770944"/>
+        <c:axId val="60782080"/>
       </c:barChart>
       <c:catAx>
-        <c:axId val="56896128"/>
+        <c:axId val="60770944"/>
         <c:scaling>
           <c:orientation val="minMax"/>
         </c:scaling>
+        <c:delete val="0"/>
         <c:axPos val="b"/>
+        <c:majorTickMark val="out"/>
+        <c:minorTickMark val="none"/>
         <c:tickLblPos val="nextTo"/>
         <c:txPr>
           <a:bodyPr/>
@@ -516,19 +542,21 @@
             <a:endParaRPr lang="en-US"/>
           </a:p>
         </c:txPr>
-        <c:crossAx val="56903168"/>
+        <c:crossAx val="60782080"/>
         <c:crosses val="autoZero"/>
         <c:auto val="1"/>
         <c:lblAlgn val="ctr"/>
         <c:lblOffset val="100"/>
+        <c:noMultiLvlLbl val="0"/>
       </c:catAx>
       <c:valAx>
-        <c:axId val="56903168"/>
+        <c:axId val="60782080"/>
         <c:scaling>
           <c:orientation val="minMax"/>
           <c:max val="330000"/>
           <c:min val="0"/>
         </c:scaling>
+        <c:delete val="0"/>
         <c:axPos val="l"/>
         <c:majorGridlines/>
         <c:title>
@@ -541,15 +569,18 @@
                   <a:defRPr sz="3200"/>
                 </a:pPr>
                 <a:r>
-                  <a:rPr lang="en-US" sz="3200"/>
+                  <a:rPr lang="en-US" sz="3200" dirty="0"/>
                   <a:t>IOPS</a:t>
                 </a:r>
               </a:p>
             </c:rich>
           </c:tx>
           <c:layout/>
+          <c:overlay val="0"/>
         </c:title>
         <c:numFmt formatCode="General" sourceLinked="1"/>
+        <c:majorTickMark val="out"/>
+        <c:minorTickMark val="none"/>
         <c:tickLblPos val="nextTo"/>
         <c:txPr>
           <a:bodyPr/>
@@ -561,7 +592,7 @@
             <a:endParaRPr lang="en-US"/>
           </a:p>
         </c:txPr>
-        <c:crossAx val="56896128"/>
+        <c:crossAx val="60770944"/>
         <c:crosses val="autoZero"/>
         <c:crossBetween val="between"/>
       </c:valAx>
@@ -569,6 +600,7 @@
     <c:legend>
       <c:legendPos val="r"/>
       <c:layout/>
+      <c:overlay val="0"/>
       <c:txPr>
         <a:bodyPr/>
         <a:lstStyle/>
@@ -581,14 +613,28 @@
       </c:txPr>
     </c:legend>
     <c:plotVisOnly val="1"/>
+    <c:dispBlanksAs val="gap"/>
+    <c:showDLblsOverMax val="0"/>
   </c:chart>
-  <c:externalData r:id="rId2"/>
+  <c:externalData r:id="rId2">
+    <c:autoUpdate val="0"/>
+  </c:externalData>
 </c:chartSpace>
 </file>
 
 <file path=ppt/charts/chart2.xml><?xml version="1.0" encoding="utf-8"?>
 <c:chartSpace xmlns:c="http://schemas.openxmlformats.org/drawingml/2006/chart" xmlns:a="http://schemas.openxmlformats.org/drawingml/2006/main" xmlns:r="http://schemas.openxmlformats.org/officeDocument/2006/relationships">
+  <c:date1904 val="0"/>
   <c:lang val="en-US"/>
+  <c:roundedCorners val="0"/>
+  <mc:AlternateContent xmlns:mc="http://schemas.openxmlformats.org/markup-compatibility/2006">
+    <mc:Choice xmlns:c14="http://schemas.microsoft.com/office/drawing/2007/8/2/chart" Requires="c14">
+      <c14:style val="102"/>
+    </mc:Choice>
+    <mc:Fallback>
+      <c:style val="2"/>
+    </mc:Fallback>
+  </mc:AlternateContent>
   <c:clrMapOvr bg1="lt1" tx1="dk1" bg2="lt2" tx2="dk2" accent1="accent1" accent2="accent2" accent3="accent3" accent4="accent4" accent5="accent5" accent6="accent6" hlink="hlink" folHlink="folHlink"/>
   <c:chart>
     <c:title>
@@ -601,397 +647,21 @@
               <a:defRPr sz="4000"/>
             </a:pPr>
             <a:r>
-              <a:rPr lang="en-US" sz="4000"/>
-              <a:t>Latency</a:t>
+              <a:rPr lang="en-US" sz="4000" dirty="0"/>
+              <a:t>Bandwidth</a:t>
             </a:r>
           </a:p>
         </c:rich>
       </c:tx>
       <c:layout/>
+      <c:overlay val="0"/>
     </c:title>
+    <c:autoTitleDeleted val="0"/>
     <c:plotArea>
       <c:layout/>
       <c:lineChart>
         <c:grouping val="standard"/>
-        <c:ser>
-          <c:idx val="0"/>
-          <c:order val="0"/>
-          <c:tx>
-            <c:strRef>
-              <c:f>Graphs!$N$37</c:f>
-              <c:strCache>
-                <c:ptCount val="1"/>
-                <c:pt idx="0">
-                  <c:v>1 IO Depth</c:v>
-                </c:pt>
-              </c:strCache>
-            </c:strRef>
-          </c:tx>
-          <c:spPr>
-            <a:ln w="76200"/>
-          </c:spPr>
-          <c:marker>
-            <c:symbol val="none"/>
-          </c:marker>
-          <c:cat>
-            <c:strRef>
-              <c:f>Graphs!$O$36:$R$36</c:f>
-              <c:strCache>
-                <c:ptCount val="4"/>
-                <c:pt idx="0">
-                  <c:v>4K Block Size</c:v>
-                </c:pt>
-                <c:pt idx="1">
-                  <c:v>32K Block Size</c:v>
-                </c:pt>
-                <c:pt idx="2">
-                  <c:v>64K Block Size</c:v>
-                </c:pt>
-                <c:pt idx="3">
-                  <c:v>128K Block Size</c:v>
-                </c:pt>
-              </c:strCache>
-            </c:strRef>
-          </c:cat>
-          <c:val>
-            <c:numRef>
-              <c:f>Graphs!$O$37:$R$37</c:f>
-              <c:numCache>
-                <c:formatCode>General</c:formatCode>
-                <c:ptCount val="4"/>
-                <c:pt idx="0">
-                  <c:v>387.72349799999995</c:v>
-                </c:pt>
-                <c:pt idx="1">
-                  <c:v>398.72160399999996</c:v>
-                </c:pt>
-                <c:pt idx="2">
-                  <c:v>408.24832699999996</c:v>
-                </c:pt>
-                <c:pt idx="3">
-                  <c:v>483.15612999999996</c:v>
-                </c:pt>
-              </c:numCache>
-            </c:numRef>
-          </c:val>
-        </c:ser>
-        <c:ser>
-          <c:idx val="1"/>
-          <c:order val="1"/>
-          <c:tx>
-            <c:strRef>
-              <c:f>Graphs!$N$38</c:f>
-              <c:strCache>
-                <c:ptCount val="1"/>
-                <c:pt idx="0">
-                  <c:v>32 IO Depth</c:v>
-                </c:pt>
-              </c:strCache>
-            </c:strRef>
-          </c:tx>
-          <c:spPr>
-            <a:ln w="76200">
-              <a:solidFill>
-                <a:srgbClr val="92D050"/>
-              </a:solidFill>
-            </a:ln>
-          </c:spPr>
-          <c:marker>
-            <c:symbol val="none"/>
-          </c:marker>
-          <c:cat>
-            <c:strRef>
-              <c:f>Graphs!$O$36:$R$36</c:f>
-              <c:strCache>
-                <c:ptCount val="4"/>
-                <c:pt idx="0">
-                  <c:v>4K Block Size</c:v>
-                </c:pt>
-                <c:pt idx="1">
-                  <c:v>32K Block Size</c:v>
-                </c:pt>
-                <c:pt idx="2">
-                  <c:v>64K Block Size</c:v>
-                </c:pt>
-                <c:pt idx="3">
-                  <c:v>128K Block Size</c:v>
-                </c:pt>
-              </c:strCache>
-            </c:strRef>
-          </c:cat>
-          <c:val>
-            <c:numRef>
-              <c:f>Graphs!$O$38:$R$38</c:f>
-              <c:numCache>
-                <c:formatCode>General</c:formatCode>
-                <c:ptCount val="4"/>
-                <c:pt idx="0">
-                  <c:v>476.11998300000005</c:v>
-                </c:pt>
-                <c:pt idx="1">
-                  <c:v>1349.8129739999999</c:v>
-                </c:pt>
-                <c:pt idx="2">
-                  <c:v>2053.7391580000003</c:v>
-                </c:pt>
-                <c:pt idx="3">
-                  <c:v>3687.8857390000003</c:v>
-                </c:pt>
-              </c:numCache>
-            </c:numRef>
-          </c:val>
-        </c:ser>
-        <c:ser>
-          <c:idx val="2"/>
-          <c:order val="2"/>
-          <c:tx>
-            <c:strRef>
-              <c:f>Graphs!$N$39</c:f>
-              <c:strCache>
-                <c:ptCount val="1"/>
-                <c:pt idx="0">
-                  <c:v>64 IO Depth</c:v>
-                </c:pt>
-              </c:strCache>
-            </c:strRef>
-          </c:tx>
-          <c:spPr>
-            <a:ln w="76200">
-              <a:solidFill>
-                <a:srgbClr val="FF822D"/>
-              </a:solidFill>
-            </a:ln>
-          </c:spPr>
-          <c:marker>
-            <c:symbol val="none"/>
-          </c:marker>
-          <c:cat>
-            <c:strRef>
-              <c:f>Graphs!$O$36:$R$36</c:f>
-              <c:strCache>
-                <c:ptCount val="4"/>
-                <c:pt idx="0">
-                  <c:v>4K Block Size</c:v>
-                </c:pt>
-                <c:pt idx="1">
-                  <c:v>32K Block Size</c:v>
-                </c:pt>
-                <c:pt idx="2">
-                  <c:v>64K Block Size</c:v>
-                </c:pt>
-                <c:pt idx="3">
-                  <c:v>128K Block Size</c:v>
-                </c:pt>
-              </c:strCache>
-            </c:strRef>
-          </c:cat>
-          <c:val>
-            <c:numRef>
-              <c:f>Graphs!$O$39:$R$39</c:f>
-              <c:numCache>
-                <c:formatCode>General</c:formatCode>
-                <c:ptCount val="4"/>
-                <c:pt idx="0">
-                  <c:v>859.33318299999996</c:v>
-                </c:pt>
-                <c:pt idx="1">
-                  <c:v>1991.5095550000003</c:v>
-                </c:pt>
-                <c:pt idx="2">
-                  <c:v>3943.362658</c:v>
-                </c:pt>
-                <c:pt idx="3">
-                  <c:v>7269.1727280000005</c:v>
-                </c:pt>
-              </c:numCache>
-            </c:numRef>
-          </c:val>
-        </c:ser>
-        <c:ser>
-          <c:idx val="3"/>
-          <c:order val="3"/>
-          <c:tx>
-            <c:strRef>
-              <c:f>Graphs!$N$40</c:f>
-              <c:strCache>
-                <c:ptCount val="1"/>
-                <c:pt idx="0">
-                  <c:v>128 IO Depth</c:v>
-                </c:pt>
-              </c:strCache>
-            </c:strRef>
-          </c:tx>
-          <c:spPr>
-            <a:ln w="76200">
-              <a:solidFill>
-                <a:srgbClr val="FFFFFF">
-                  <a:lumMod val="65000"/>
-                </a:srgbClr>
-              </a:solidFill>
-            </a:ln>
-          </c:spPr>
-          <c:marker>
-            <c:symbol val="none"/>
-          </c:marker>
-          <c:cat>
-            <c:strRef>
-              <c:f>Graphs!$O$36:$R$36</c:f>
-              <c:strCache>
-                <c:ptCount val="4"/>
-                <c:pt idx="0">
-                  <c:v>4K Block Size</c:v>
-                </c:pt>
-                <c:pt idx="1">
-                  <c:v>32K Block Size</c:v>
-                </c:pt>
-                <c:pt idx="2">
-                  <c:v>64K Block Size</c:v>
-                </c:pt>
-                <c:pt idx="3">
-                  <c:v>128K Block Size</c:v>
-                </c:pt>
-              </c:strCache>
-            </c:strRef>
-          </c:cat>
-          <c:val>
-            <c:numRef>
-              <c:f>Graphs!$O$40:$R$40</c:f>
-              <c:numCache>
-                <c:formatCode>General</c:formatCode>
-                <c:ptCount val="4"/>
-                <c:pt idx="0">
-                  <c:v>1937.5683750000001</c:v>
-                </c:pt>
-                <c:pt idx="1">
-                  <c:v>3958.7059749999999</c:v>
-                </c:pt>
-                <c:pt idx="2">
-                  <c:v>7364.4767449999999</c:v>
-                </c:pt>
-                <c:pt idx="3">
-                  <c:v>14528.414701000002</c:v>
-                </c:pt>
-              </c:numCache>
-            </c:numRef>
-          </c:val>
-        </c:ser>
-        <c:marker val="1"/>
-        <c:axId val="56925568"/>
-        <c:axId val="56935936"/>
-      </c:lineChart>
-      <c:catAx>
-        <c:axId val="56925568"/>
-        <c:scaling>
-          <c:orientation val="minMax"/>
-        </c:scaling>
-        <c:axPos val="b"/>
-        <c:tickLblPos val="nextTo"/>
-        <c:txPr>
-          <a:bodyPr/>
-          <a:lstStyle/>
-          <a:p>
-            <a:pPr>
-              <a:defRPr sz="3200" b="1"/>
-            </a:pPr>
-            <a:endParaRPr lang="en-US"/>
-          </a:p>
-        </c:txPr>
-        <c:crossAx val="56935936"/>
-        <c:crosses val="autoZero"/>
-        <c:auto val="1"/>
-        <c:lblAlgn val="ctr"/>
-        <c:lblOffset val="100"/>
-      </c:catAx>
-      <c:valAx>
-        <c:axId val="56935936"/>
-        <c:scaling>
-          <c:orientation val="minMax"/>
-        </c:scaling>
-        <c:axPos val="l"/>
-        <c:majorGridlines/>
-        <c:title>
-          <c:tx>
-            <c:rich>
-              <a:bodyPr rot="-5400000" vert="horz"/>
-              <a:lstStyle/>
-              <a:p>
-                <a:pPr>
-                  <a:defRPr sz="3200"/>
-                </a:pPr>
-                <a:r>
-                  <a:rPr lang="en-US" sz="3200"/>
-                  <a:t>Read Latency Avg (ms)</a:t>
-                </a:r>
-              </a:p>
-            </c:rich>
-          </c:tx>
-          <c:layout/>
-        </c:title>
-        <c:numFmt formatCode="General" sourceLinked="1"/>
-        <c:tickLblPos val="nextTo"/>
-        <c:txPr>
-          <a:bodyPr/>
-          <a:lstStyle/>
-          <a:p>
-            <a:pPr>
-              <a:defRPr sz="3200" b="1"/>
-            </a:pPr>
-            <a:endParaRPr lang="en-US"/>
-          </a:p>
-        </c:txPr>
-        <c:crossAx val="56925568"/>
-        <c:crosses val="autoZero"/>
-        <c:crossBetween val="between"/>
-      </c:valAx>
-    </c:plotArea>
-    <c:legend>
-      <c:legendPos val="r"/>
-      <c:layout/>
-      <c:txPr>
-        <a:bodyPr/>
-        <a:lstStyle/>
-        <a:p>
-          <a:pPr>
-            <a:defRPr sz="3200" b="1"/>
-          </a:pPr>
-          <a:endParaRPr lang="en-US"/>
-        </a:p>
-      </c:txPr>
-    </c:legend>
-    <c:plotVisOnly val="1"/>
-  </c:chart>
-  <c:externalData r:id="rId2"/>
-</c:chartSpace>
-</file>
-
-<file path=ppt/charts/chart3.xml><?xml version="1.0" encoding="utf-8"?>
-<c:chartSpace xmlns:c="http://schemas.openxmlformats.org/drawingml/2006/chart" xmlns:a="http://schemas.openxmlformats.org/drawingml/2006/main" xmlns:r="http://schemas.openxmlformats.org/officeDocument/2006/relationships">
-  <c:date1904 val="1"/>
-  <c:lang val="en-US"/>
-  <c:clrMapOvr bg1="lt1" tx1="dk1" bg2="lt2" tx2="dk2" accent1="accent1" accent2="accent2" accent3="accent3" accent4="accent4" accent5="accent5" accent6="accent6" hlink="hlink" folHlink="folHlink"/>
-  <c:chart>
-    <c:title>
-      <c:tx>
-        <c:rich>
-          <a:bodyPr/>
-          <a:lstStyle/>
-          <a:p>
-            <a:pPr>
-              <a:defRPr sz="4000"/>
-            </a:pPr>
-            <a:r>
-              <a:rPr lang="en-US" sz="4000"/>
-              <a:t>Bandwidth</a:t>
-            </a:r>
-          </a:p>
-        </c:rich>
-      </c:tx>
-      <c:layout/>
-    </c:title>
-    <c:plotArea>
-      <c:layout/>
-      <c:lineChart>
-        <c:grouping val="standard"/>
+        <c:varyColors val="0"/>
         <c:ser>
           <c:idx val="0"/>
           <c:order val="0"/>
@@ -1045,7 +715,7 @@
                   <c:v>2.5503999999999998</c:v>
                 </c:pt>
                 <c:pt idx="2">
-                  <c:v>4.9801839999999995</c:v>
+                  <c:v>4.9801839999999986</c:v>
                 </c:pt>
                 <c:pt idx="3">
                   <c:v>8.4189679999999996</c:v>
@@ -1053,6 +723,7 @@
               </c:numCache>
             </c:numRef>
           </c:val>
+          <c:smooth val="0"/>
         </c:ser>
         <c:ser>
           <c:idx val="1"/>
@@ -1108,10 +779,10 @@
                   <c:v>8.5931840000000008</c:v>
                 </c:pt>
                 <c:pt idx="1">
-                  <c:v>24.265447999999992</c:v>
+                  <c:v>24.265447999999985</c:v>
                 </c:pt>
                 <c:pt idx="2">
-                  <c:v>31.898791999999997</c:v>
+                  <c:v>31.898791999999986</c:v>
                 </c:pt>
                 <c:pt idx="3">
                   <c:v>35.520056000000011</c:v>
@@ -1119,6 +790,7 @@
               </c:numCache>
             </c:numRef>
           </c:val>
+          <c:smooth val="0"/>
         </c:ser>
         <c:ser>
           <c:idx val="2"/>
@@ -1185,6 +857,7 @@
               </c:numCache>
             </c:numRef>
           </c:val>
+          <c:smooth val="0"/>
         </c:ser>
         <c:ser>
           <c:idx val="3"/>
@@ -1203,9 +876,7 @@
           <c:spPr>
             <a:ln w="76200">
               <a:solidFill>
-                <a:srgbClr val="FFFFFF">
-                  <a:lumMod val="65000"/>
-                </a:srgbClr>
+                <a:srgbClr val="8F45C7"/>
               </a:solidFill>
             </a:ln>
           </c:spPr>
@@ -1239,7 +910,7 @@
                 <c:formatCode>General</c:formatCode>
                 <c:ptCount val="4"/>
                 <c:pt idx="0">
-                  <c:v>8.4517840000000017</c:v>
+                  <c:v>8.4517840000000053</c:v>
                 </c:pt>
                 <c:pt idx="1">
                   <c:v>33.094576000000011</c:v>
@@ -1248,11 +919,12 @@
                   <c:v>35.574704000000004</c:v>
                 </c:pt>
                 <c:pt idx="3">
-                  <c:v>36.054247999999994</c:v>
+                  <c:v>36.05424799999998</c:v>
                 </c:pt>
               </c:numCache>
             </c:numRef>
           </c:val>
+          <c:smooth val="0"/>
         </c:ser>
         <c:ser>
           <c:idx val="4"/>
@@ -1320,17 +992,30 @@
               </c:numCache>
             </c:numRef>
           </c:val>
+          <c:smooth val="0"/>
         </c:ser>
+        <c:dLbls>
+          <c:showLegendKey val="0"/>
+          <c:showVal val="0"/>
+          <c:showCatName val="0"/>
+          <c:showSerName val="0"/>
+          <c:showPercent val="0"/>
+          <c:showBubbleSize val="0"/>
+        </c:dLbls>
         <c:marker val="1"/>
-        <c:axId val="58316672"/>
-        <c:axId val="58328960"/>
+        <c:smooth val="0"/>
+        <c:axId val="84570880"/>
+        <c:axId val="84572416"/>
       </c:lineChart>
       <c:catAx>
-        <c:axId val="58316672"/>
+        <c:axId val="84570880"/>
         <c:scaling>
           <c:orientation val="minMax"/>
         </c:scaling>
+        <c:delete val="0"/>
         <c:axPos val="b"/>
+        <c:majorTickMark val="out"/>
+        <c:minorTickMark val="none"/>
         <c:tickLblPos val="nextTo"/>
         <c:txPr>
           <a:bodyPr/>
@@ -1342,17 +1027,19 @@
             <a:endParaRPr lang="en-US"/>
           </a:p>
         </c:txPr>
-        <c:crossAx val="58328960"/>
+        <c:crossAx val="84572416"/>
         <c:crosses val="autoZero"/>
         <c:auto val="1"/>
         <c:lblAlgn val="ctr"/>
         <c:lblOffset val="100"/>
+        <c:noMultiLvlLbl val="0"/>
       </c:catAx>
       <c:valAx>
-        <c:axId val="58328960"/>
+        <c:axId val="84572416"/>
         <c:scaling>
           <c:orientation val="minMax"/>
         </c:scaling>
+        <c:delete val="0"/>
         <c:axPos val="l"/>
         <c:majorGridlines/>
         <c:title>
@@ -1365,20 +1052,31 @@
                   <a:defRPr sz="3200"/>
                 </a:pPr>
                 <a:r>
-                  <a:rPr lang="en-US" sz="3200"/>
+                  <a:rPr lang="en-US" sz="3200" dirty="0"/>
                   <a:t>Read</a:t>
                 </a:r>
                 <a:r>
-                  <a:rPr lang="en-US" sz="3200" baseline="0"/>
-                  <a:t> Bandwidth (in Gb/s)</a:t>
+                  <a:rPr lang="en-US" sz="3200" baseline="0" dirty="0"/>
+                  <a:t> Bandwidth (in </a:t>
                 </a:r>
-                <a:endParaRPr lang="en-US" sz="3200"/>
+                <a:r>
+                  <a:rPr lang="en-US" sz="3200" baseline="0" dirty="0" err="1"/>
+                  <a:t>Gb</a:t>
+                </a:r>
+                <a:r>
+                  <a:rPr lang="en-US" sz="3200" baseline="0" dirty="0"/>
+                  <a:t>/s)</a:t>
+                </a:r>
+                <a:endParaRPr lang="en-US" sz="3200" dirty="0"/>
               </a:p>
             </c:rich>
           </c:tx>
           <c:layout/>
+          <c:overlay val="0"/>
         </c:title>
         <c:numFmt formatCode="General" sourceLinked="1"/>
+        <c:majorTickMark val="out"/>
+        <c:minorTickMark val="none"/>
         <c:tickLblPos val="nextTo"/>
         <c:txPr>
           <a:bodyPr/>
@@ -1390,7 +1088,7 @@
             <a:endParaRPr lang="en-US"/>
           </a:p>
         </c:txPr>
-        <c:crossAx val="58316672"/>
+        <c:crossAx val="84570880"/>
         <c:crosses val="autoZero"/>
         <c:crossBetween val="between"/>
       </c:valAx>
@@ -1398,6 +1096,7 @@
     <c:legend>
       <c:legendPos val="r"/>
       <c:layout/>
+      <c:overlay val="0"/>
       <c:txPr>
         <a:bodyPr/>
         <a:lstStyle/>
@@ -1410,8 +1109,457 @@
       </c:txPr>
     </c:legend>
     <c:plotVisOnly val="1"/>
+    <c:dispBlanksAs val="gap"/>
+    <c:showDLblsOverMax val="0"/>
   </c:chart>
-  <c:externalData r:id="rId2"/>
+  <c:externalData r:id="rId2">
+    <c:autoUpdate val="0"/>
+  </c:externalData>
+</c:chartSpace>
+</file>
+
+<file path=ppt/charts/chart3.xml><?xml version="1.0" encoding="utf-8"?>
+<c:chartSpace xmlns:c="http://schemas.openxmlformats.org/drawingml/2006/chart" xmlns:a="http://schemas.openxmlformats.org/drawingml/2006/main" xmlns:r="http://schemas.openxmlformats.org/officeDocument/2006/relationships">
+  <c:date1904 val="0"/>
+  <c:lang val="en-US"/>
+  <c:roundedCorners val="0"/>
+  <mc:AlternateContent xmlns:mc="http://schemas.openxmlformats.org/markup-compatibility/2006">
+    <mc:Choice xmlns:c14="http://schemas.microsoft.com/office/drawing/2007/8/2/chart" Requires="c14">
+      <c14:style val="102"/>
+    </mc:Choice>
+    <mc:Fallback>
+      <c:style val="2"/>
+    </mc:Fallback>
+  </mc:AlternateContent>
+  <c:clrMapOvr bg1="lt1" tx1="dk1" bg2="lt2" tx2="dk2" accent1="accent1" accent2="accent2" accent3="accent3" accent4="accent4" accent5="accent5" accent6="accent6" hlink="hlink" folHlink="folHlink"/>
+  <c:chart>
+    <c:title>
+      <c:tx>
+        <c:rich>
+          <a:bodyPr/>
+          <a:lstStyle/>
+          <a:p>
+            <a:pPr>
+              <a:defRPr sz="4000"/>
+            </a:pPr>
+            <a:r>
+              <a:rPr lang="en-US" sz="4000"/>
+              <a:t>Latency</a:t>
+            </a:r>
+          </a:p>
+        </c:rich>
+      </c:tx>
+      <c:layout/>
+      <c:overlay val="0"/>
+    </c:title>
+    <c:autoTitleDeleted val="0"/>
+    <c:plotArea>
+      <c:layout/>
+      <c:lineChart>
+        <c:grouping val="standard"/>
+        <c:varyColors val="0"/>
+        <c:ser>
+          <c:idx val="0"/>
+          <c:order val="0"/>
+          <c:tx>
+            <c:strRef>
+              <c:f>Graphs!$N$37</c:f>
+              <c:strCache>
+                <c:ptCount val="1"/>
+                <c:pt idx="0">
+                  <c:v>1 IO Depth</c:v>
+                </c:pt>
+              </c:strCache>
+            </c:strRef>
+          </c:tx>
+          <c:spPr>
+            <a:ln w="76200"/>
+          </c:spPr>
+          <c:marker>
+            <c:symbol val="none"/>
+          </c:marker>
+          <c:cat>
+            <c:strRef>
+              <c:f>Graphs!$O$36:$R$36</c:f>
+              <c:strCache>
+                <c:ptCount val="4"/>
+                <c:pt idx="0">
+                  <c:v>4K Block Size</c:v>
+                </c:pt>
+                <c:pt idx="1">
+                  <c:v>32K Block Size</c:v>
+                </c:pt>
+                <c:pt idx="2">
+                  <c:v>64K Block Size</c:v>
+                </c:pt>
+                <c:pt idx="3">
+                  <c:v>128K Block Size</c:v>
+                </c:pt>
+              </c:strCache>
+            </c:strRef>
+          </c:cat>
+          <c:val>
+            <c:numRef>
+              <c:f>Graphs!$O$37:$R$37</c:f>
+              <c:numCache>
+                <c:formatCode>General</c:formatCode>
+                <c:ptCount val="4"/>
+                <c:pt idx="0">
+                  <c:v>387.72349800000001</c:v>
+                </c:pt>
+                <c:pt idx="1">
+                  <c:v>398.72160400000001</c:v>
+                </c:pt>
+                <c:pt idx="2">
+                  <c:v>408.24832700000002</c:v>
+                </c:pt>
+                <c:pt idx="3">
+                  <c:v>483.15613000000002</c:v>
+                </c:pt>
+              </c:numCache>
+            </c:numRef>
+          </c:val>
+          <c:smooth val="0"/>
+        </c:ser>
+        <c:ser>
+          <c:idx val="1"/>
+          <c:order val="1"/>
+          <c:tx>
+            <c:strRef>
+              <c:f>Graphs!$N$38</c:f>
+              <c:strCache>
+                <c:ptCount val="1"/>
+                <c:pt idx="0">
+                  <c:v>32 IO Depth</c:v>
+                </c:pt>
+              </c:strCache>
+            </c:strRef>
+          </c:tx>
+          <c:spPr>
+            <a:ln w="76200">
+              <a:solidFill>
+                <a:srgbClr val="7FD13B"/>
+              </a:solidFill>
+            </a:ln>
+          </c:spPr>
+          <c:marker>
+            <c:symbol val="none"/>
+          </c:marker>
+          <c:cat>
+            <c:strRef>
+              <c:f>Graphs!$O$36:$R$36</c:f>
+              <c:strCache>
+                <c:ptCount val="4"/>
+                <c:pt idx="0">
+                  <c:v>4K Block Size</c:v>
+                </c:pt>
+                <c:pt idx="1">
+                  <c:v>32K Block Size</c:v>
+                </c:pt>
+                <c:pt idx="2">
+                  <c:v>64K Block Size</c:v>
+                </c:pt>
+                <c:pt idx="3">
+                  <c:v>128K Block Size</c:v>
+                </c:pt>
+              </c:strCache>
+            </c:strRef>
+          </c:cat>
+          <c:val>
+            <c:numRef>
+              <c:f>Graphs!$O$38:$R$38</c:f>
+              <c:numCache>
+                <c:formatCode>General</c:formatCode>
+                <c:ptCount val="4"/>
+                <c:pt idx="0">
+                  <c:v>476.11998299999999</c:v>
+                </c:pt>
+                <c:pt idx="1">
+                  <c:v>1349.8129739999999</c:v>
+                </c:pt>
+                <c:pt idx="2">
+                  <c:v>2053.7391579999999</c:v>
+                </c:pt>
+                <c:pt idx="3">
+                  <c:v>3687.8857389999998</c:v>
+                </c:pt>
+              </c:numCache>
+            </c:numRef>
+          </c:val>
+          <c:smooth val="0"/>
+        </c:ser>
+        <c:ser>
+          <c:idx val="2"/>
+          <c:order val="2"/>
+          <c:tx>
+            <c:strRef>
+              <c:f>Graphs!$N$39</c:f>
+              <c:strCache>
+                <c:ptCount val="1"/>
+                <c:pt idx="0">
+                  <c:v>64 IO Depth</c:v>
+                </c:pt>
+              </c:strCache>
+            </c:strRef>
+          </c:tx>
+          <c:spPr>
+            <a:ln w="76200">
+              <a:solidFill>
+                <a:srgbClr val="FF6600"/>
+              </a:solidFill>
+            </a:ln>
+          </c:spPr>
+          <c:marker>
+            <c:symbol val="none"/>
+          </c:marker>
+          <c:cat>
+            <c:strRef>
+              <c:f>Graphs!$O$36:$R$36</c:f>
+              <c:strCache>
+                <c:ptCount val="4"/>
+                <c:pt idx="0">
+                  <c:v>4K Block Size</c:v>
+                </c:pt>
+                <c:pt idx="1">
+                  <c:v>32K Block Size</c:v>
+                </c:pt>
+                <c:pt idx="2">
+                  <c:v>64K Block Size</c:v>
+                </c:pt>
+                <c:pt idx="3">
+                  <c:v>128K Block Size</c:v>
+                </c:pt>
+              </c:strCache>
+            </c:strRef>
+          </c:cat>
+          <c:val>
+            <c:numRef>
+              <c:f>Graphs!$O$39:$R$39</c:f>
+              <c:numCache>
+                <c:formatCode>General</c:formatCode>
+                <c:ptCount val="4"/>
+                <c:pt idx="0">
+                  <c:v>859.33318299999996</c:v>
+                </c:pt>
+                <c:pt idx="1">
+                  <c:v>1991.5095550000001</c:v>
+                </c:pt>
+                <c:pt idx="2">
+                  <c:v>3943.362658</c:v>
+                </c:pt>
+                <c:pt idx="3">
+                  <c:v>7269.1727279999996</c:v>
+                </c:pt>
+              </c:numCache>
+            </c:numRef>
+          </c:val>
+          <c:smooth val="0"/>
+        </c:ser>
+        <c:ser>
+          <c:idx val="3"/>
+          <c:order val="3"/>
+          <c:tx>
+            <c:strRef>
+              <c:f>Graphs!$N$40</c:f>
+              <c:strCache>
+                <c:ptCount val="1"/>
+                <c:pt idx="0">
+                  <c:v>128 IO Depth</c:v>
+                </c:pt>
+              </c:strCache>
+            </c:strRef>
+          </c:tx>
+          <c:spPr>
+            <a:ln w="76200">
+              <a:solidFill>
+                <a:srgbClr val="8F45C7"/>
+              </a:solidFill>
+            </a:ln>
+          </c:spPr>
+          <c:marker>
+            <c:symbol val="none"/>
+          </c:marker>
+          <c:cat>
+            <c:strRef>
+              <c:f>Graphs!$O$36:$R$36</c:f>
+              <c:strCache>
+                <c:ptCount val="4"/>
+                <c:pt idx="0">
+                  <c:v>4K Block Size</c:v>
+                </c:pt>
+                <c:pt idx="1">
+                  <c:v>32K Block Size</c:v>
+                </c:pt>
+                <c:pt idx="2">
+                  <c:v>64K Block Size</c:v>
+                </c:pt>
+                <c:pt idx="3">
+                  <c:v>128K Block Size</c:v>
+                </c:pt>
+              </c:strCache>
+            </c:strRef>
+          </c:cat>
+          <c:val>
+            <c:numRef>
+              <c:f>Graphs!$O$40:$R$40</c:f>
+              <c:numCache>
+                <c:formatCode>General</c:formatCode>
+                <c:ptCount val="4"/>
+                <c:pt idx="0">
+                  <c:v>1937.5683750000001</c:v>
+                </c:pt>
+                <c:pt idx="1">
+                  <c:v>3958.7059749999999</c:v>
+                </c:pt>
+                <c:pt idx="2">
+                  <c:v>7364.4767449999999</c:v>
+                </c:pt>
+                <c:pt idx="3">
+                  <c:v>14528.414701</c:v>
+                </c:pt>
+              </c:numCache>
+            </c:numRef>
+          </c:val>
+          <c:smooth val="0"/>
+        </c:ser>
+        <c:dLbls>
+          <c:showLegendKey val="0"/>
+          <c:showVal val="0"/>
+          <c:showCatName val="0"/>
+          <c:showSerName val="0"/>
+          <c:showPercent val="0"/>
+          <c:showBubbleSize val="0"/>
+        </c:dLbls>
+        <c:marker val="1"/>
+        <c:smooth val="0"/>
+        <c:axId val="97965184"/>
+        <c:axId val="103732736"/>
+      </c:lineChart>
+      <c:catAx>
+        <c:axId val="97965184"/>
+        <c:scaling>
+          <c:orientation val="minMax"/>
+        </c:scaling>
+        <c:delete val="0"/>
+        <c:axPos val="b"/>
+        <c:majorTickMark val="out"/>
+        <c:minorTickMark val="none"/>
+        <c:tickLblPos val="nextTo"/>
+        <c:txPr>
+          <a:bodyPr/>
+          <a:lstStyle/>
+          <a:p>
+            <a:pPr>
+              <a:defRPr sz="3200" b="1"/>
+            </a:pPr>
+            <a:endParaRPr lang="en-US"/>
+          </a:p>
+        </c:txPr>
+        <c:crossAx val="103732736"/>
+        <c:crosses val="autoZero"/>
+        <c:auto val="1"/>
+        <c:lblAlgn val="ctr"/>
+        <c:lblOffset val="100"/>
+        <c:noMultiLvlLbl val="0"/>
+      </c:catAx>
+      <c:valAx>
+        <c:axId val="103732736"/>
+        <c:scaling>
+          <c:orientation val="minMax"/>
+        </c:scaling>
+        <c:delete val="0"/>
+        <c:axPos val="l"/>
+        <c:majorGridlines/>
+        <c:title>
+          <c:tx>
+            <c:rich>
+              <a:bodyPr rot="-5400000" vert="horz"/>
+              <a:lstStyle/>
+              <a:p>
+                <a:pPr>
+                  <a:defRPr sz="3200"/>
+                </a:pPr>
+                <a:r>
+                  <a:rPr lang="en-US" sz="3200" dirty="0"/>
+                  <a:t>Read Latency </a:t>
+                </a:r>
+                <a:r>
+                  <a:rPr lang="en-US" sz="3200" dirty="0" err="1"/>
+                  <a:t>Avg</a:t>
+                </a:r>
+                <a:r>
+                  <a:rPr lang="en-US" sz="3200" dirty="0"/>
+                  <a:t> </a:t>
+                </a:r>
+                <a:r>
+                  <a:rPr lang="en-US" sz="3200" dirty="0" smtClean="0"/>
+                  <a:t>(</a:t>
+                </a:r>
+                <a:r>
+                  <a:rPr lang="en-US" sz="3200" dirty="0">
+                    <a:latin typeface="+mn-lt"/>
+                    <a:cs typeface="Arial"/>
+                  </a:rPr>
+                  <a:t>m</a:t>
+                </a:r>
+                <a:r>
+                  <a:rPr lang="en-US" sz="3200" smtClean="0"/>
+                  <a:t>s</a:t>
+                </a:r>
+                <a:r>
+                  <a:rPr lang="en-US" sz="3200" dirty="0"/>
+                  <a:t>)</a:t>
+                </a:r>
+              </a:p>
+            </c:rich>
+          </c:tx>
+          <c:layout/>
+          <c:overlay val="0"/>
+        </c:title>
+        <c:numFmt formatCode="General" sourceLinked="1"/>
+        <c:majorTickMark val="out"/>
+        <c:minorTickMark val="none"/>
+        <c:tickLblPos val="nextTo"/>
+        <c:txPr>
+          <a:bodyPr/>
+          <a:lstStyle/>
+          <a:p>
+            <a:pPr>
+              <a:defRPr sz="3200" b="1"/>
+            </a:pPr>
+            <a:endParaRPr lang="en-US"/>
+          </a:p>
+        </c:txPr>
+        <c:crossAx val="97965184"/>
+        <c:crosses val="autoZero"/>
+        <c:crossBetween val="between"/>
+        <c:dispUnits>
+          <c:builtInUnit val="thousands"/>
+        </c:dispUnits>
+      </c:valAx>
+    </c:plotArea>
+    <c:legend>
+      <c:legendPos val="r"/>
+      <c:layout/>
+      <c:overlay val="0"/>
+      <c:txPr>
+        <a:bodyPr/>
+        <a:lstStyle/>
+        <a:p>
+          <a:pPr>
+            <a:defRPr sz="3200" b="1"/>
+          </a:pPr>
+          <a:endParaRPr lang="en-US"/>
+        </a:p>
+      </c:txPr>
+    </c:legend>
+    <c:plotVisOnly val="1"/>
+    <c:dispBlanksAs val="gap"/>
+    <c:showDLblsOverMax val="0"/>
+  </c:chart>
+  <c:externalData r:id="rId2">
+    <c:autoUpdate val="0"/>
+  </c:externalData>
 </c:chartSpace>
 </file>
 
@@ -1536,7 +1684,7 @@
     </p:spTree>
     <p:extLst>
       <p:ext uri="{BB962C8B-B14F-4D97-AF65-F5344CB8AC3E}">
-        <p14:creationId xmlns="" xmlns:p14="http://schemas.microsoft.com/office/powerpoint/2010/main" val="1355538437"/>
+        <p14:creationId xmlns:p14="http://schemas.microsoft.com/office/powerpoint/2010/main" val="1355538437"/>
       </p:ext>
     </p:extLst>
   </p:cSld>
@@ -1726,7 +1874,7 @@
     </p:spTree>
     <p:extLst>
       <p:ext uri="{BB962C8B-B14F-4D97-AF65-F5344CB8AC3E}">
-        <p14:creationId xmlns="" xmlns:p14="http://schemas.microsoft.com/office/powerpoint/2010/main" val="2623383061"/>
+        <p14:creationId xmlns:p14="http://schemas.microsoft.com/office/powerpoint/2010/main" val="2623383061"/>
       </p:ext>
     </p:extLst>
   </p:cSld>
@@ -3689,7 +3837,7 @@
         </p:nvSpPr>
         <p:spPr>
           <a:xfrm>
-            <a:off x="583354" y="6873049"/>
+            <a:off x="583354" y="6911149"/>
             <a:ext cx="10607100" cy="846299"/>
           </a:xfrm>
           <a:prstGeom prst="rect">
@@ -3718,31 +3866,59 @@
             </a:pPr>
             <a:r>
               <a:rPr lang="en-US" sz="3200" dirty="0" smtClean="0"/>
-              <a:t>The objectives of this project are to assemble and benchmark a functional protocol stack. The stack will provide high throughput transfers with low CPU utilization that could be ported to Hewlett Packard Enterprise’s 3Par storage systems. To benchmark the servers, we created a custom test suite that determined read, write, buffer size, and seek performance. From the results, we concluded that this protocol stack will eliminate the network as a bottleneck in converged networks presenting </a:t>
-            </a:r>
-            <a:r>
-              <a:rPr lang="en-US" sz="3200" dirty="0" err="1" smtClean="0"/>
+              <a:t>The </a:t>
+            </a:r>
+            <a:r>
+              <a:rPr lang="en-US" sz="3200" dirty="0"/>
+              <a:t>objectives of this project are to assemble and benchmark a functional RDMA </a:t>
+            </a:r>
+            <a:r>
+              <a:rPr lang="en-US" sz="3200" dirty="0" smtClean="0"/>
+              <a:t>based network </a:t>
+            </a:r>
+            <a:r>
+              <a:rPr lang="en-US" sz="3200" dirty="0"/>
+              <a:t>protocol stack for implementing </a:t>
+            </a:r>
+            <a:r>
+              <a:rPr lang="en-US" sz="3200" dirty="0" err="1"/>
               <a:t>NVMe</a:t>
             </a:r>
             <a:r>
+              <a:rPr lang="en-US" sz="3200" dirty="0"/>
+              <a:t> over Fabrics. </a:t>
+            </a:r>
+            <a:r>
+              <a:rPr lang="en-US" sz="3200" dirty="0" err="1"/>
+              <a:t>NVMe</a:t>
+            </a:r>
+            <a:r>
+              <a:rPr lang="en-US" sz="3200" dirty="0"/>
+              <a:t> over Fabrics is a standardized solution for efficient access to fabric attached non-volatile </a:t>
+            </a:r>
+            <a:r>
               <a:rPr lang="en-US" sz="3200" dirty="0" smtClean="0"/>
-              <a:t> attached remote storage. </a:t>
-            </a:r>
-            <a:r>
-              <a:rPr lang="en-US" sz="3200" dirty="0" err="1" smtClean="0"/>
+              <a:t>memory</a:t>
+            </a:r>
+            <a:r>
+              <a:rPr lang="en-US" sz="3200" dirty="0"/>
+              <a:t> </a:t>
+            </a:r>
+            <a:r>
+              <a:rPr lang="en-US" sz="3200" dirty="0" smtClean="0"/>
+              <a:t>[1]. </a:t>
+            </a:r>
+            <a:r>
+              <a:rPr lang="en-US" sz="3200" dirty="0"/>
+              <a:t>The stack provides high throughput transfers with low CPU utilization to be ported to Hewlett Packard Enterprise’s 3Par storage systems. To benchmark the servers, we created a custom test suite that determined read and write performance. From the results, we conclude this will eliminate the network stack as a bottleneck in accessing remote </a:t>
+            </a:r>
+            <a:r>
+              <a:rPr lang="en-US" sz="3200" dirty="0" err="1"/>
               <a:t>NVMe</a:t>
             </a:r>
             <a:r>
-              <a:rPr lang="en-US" sz="3200" dirty="0" smtClean="0"/>
-              <a:t> over Fabrics is a standardized solution for efficient, attached non-volatile memory storage devices over fabrics such as RDMA and </a:t>
-            </a:r>
-            <a:r>
-              <a:rPr lang="en-US" sz="3200" dirty="0" err="1" smtClean="0"/>
-              <a:t>Fibre</a:t>
-            </a:r>
-            <a:r>
-              <a:rPr lang="en-US" sz="3200" dirty="0" smtClean="0"/>
-              <a:t> Channel.</a:t>
+              <a:rPr lang="en-US" sz="3200" dirty="0"/>
+              <a:t> storage.</a:t>
             </a:r>
           </a:p>
         </p:txBody>
@@ -3810,7 +3986,7 @@
         </p:nvSpPr>
         <p:spPr>
           <a:xfrm>
-            <a:off x="583355" y="13684346"/>
+            <a:off x="583355" y="13265246"/>
             <a:ext cx="10607100" cy="1200299"/>
           </a:xfrm>
           <a:prstGeom prst="rect">
@@ -4260,7 +4436,7 @@
         </p:nvSpPr>
         <p:spPr bwMode="ltGray">
           <a:xfrm>
-            <a:off x="1000126" y="14954249"/>
+            <a:off x="1114426" y="14497049"/>
             <a:ext cx="9572624" cy="768096"/>
           </a:xfrm>
           <a:prstGeom prst="rect">
@@ -4344,7 +4520,7 @@
         </p:nvSpPr>
         <p:spPr bwMode="ltGray">
           <a:xfrm>
-            <a:off x="971551" y="16554450"/>
+            <a:off x="971551" y="16154400"/>
             <a:ext cx="1085850" cy="1447800"/>
           </a:xfrm>
           <a:prstGeom prst="downArrow">
@@ -4411,7 +4587,7 @@
         </p:nvSpPr>
         <p:spPr bwMode="ltGray">
           <a:xfrm>
-            <a:off x="1095376" y="18897599"/>
+            <a:off x="1123951" y="18497549"/>
             <a:ext cx="9572624" cy="768096"/>
           </a:xfrm>
           <a:prstGeom prst="rect">
@@ -4495,7 +4671,7 @@
         </p:nvSpPr>
         <p:spPr bwMode="ltGray">
           <a:xfrm>
-            <a:off x="1219201" y="22355174"/>
+            <a:off x="1133476" y="22040849"/>
             <a:ext cx="9572624" cy="768096"/>
           </a:xfrm>
           <a:prstGeom prst="rect">
@@ -4570,7 +4746,7 @@
         </p:nvSpPr>
         <p:spPr bwMode="ltGray">
           <a:xfrm>
-            <a:off x="1228726" y="25307924"/>
+            <a:off x="1143001" y="25107899"/>
             <a:ext cx="9572624" cy="768096"/>
           </a:xfrm>
           <a:prstGeom prst="rect">
@@ -4635,7 +4811,7 @@
         </p:nvSpPr>
         <p:spPr bwMode="ltGray">
           <a:xfrm>
-            <a:off x="1323976" y="29698950"/>
+            <a:off x="1152526" y="29670375"/>
             <a:ext cx="9572624" cy="771525"/>
           </a:xfrm>
           <a:prstGeom prst="rect">
@@ -4706,7 +4882,7 @@
         </p:nvSpPr>
         <p:spPr bwMode="ltGray">
           <a:xfrm>
-            <a:off x="1009651" y="20231100"/>
+            <a:off x="1009651" y="19916775"/>
             <a:ext cx="1085850" cy="1447800"/>
           </a:xfrm>
           <a:prstGeom prst="downArrow">
@@ -4773,7 +4949,7 @@
         </p:nvSpPr>
         <p:spPr bwMode="ltGray">
           <a:xfrm>
-            <a:off x="990601" y="23564850"/>
+            <a:off x="990601" y="23307675"/>
             <a:ext cx="1085850" cy="1447800"/>
           </a:xfrm>
           <a:prstGeom prst="downArrow">
@@ -4840,7 +5016,7 @@
         </p:nvSpPr>
         <p:spPr bwMode="ltGray">
           <a:xfrm>
-            <a:off x="1000126" y="27079575"/>
+            <a:off x="1000126" y="26936700"/>
             <a:ext cx="1085850" cy="1447800"/>
           </a:xfrm>
           <a:prstGeom prst="downArrow">
@@ -5173,7 +5349,7 @@
             </a:r>
             <a:r>
               <a:rPr lang="en-US" sz="3200" dirty="0" smtClean="0"/>
-              <a:t> software. The new driver is expected to improve the reliability of the technology. With increased stability with the new driver, </a:t>
+              <a:t> software. The new driver is expected to improve the reliability of the technology. With increased stability from the new driver; </a:t>
             </a:r>
             <a:r>
               <a:rPr lang="en-US" sz="3200" dirty="0" err="1" smtClean="0"/>
@@ -5220,7 +5396,7 @@
             </a:pPr>
             <a:r>
               <a:rPr lang="en-US" sz="3200" dirty="0" smtClean="0"/>
-              <a:t>   We felt that the current technology showed promise in terms of its ideal benchmarking results. We were impressed by the achieved IOPS, bandwidth, and consistently low CPU utilization (&lt; 25%). With the advent of faster </a:t>
+              <a:t>   We believe that the current technology shows promise in terms of its ideal benchmarking results. We were impressed by the achieved IOPS, bandwidth, and consistently low CPU utilization (&lt; 25%). With the advent of faster </a:t>
             </a:r>
             <a:r>
               <a:rPr lang="en-US" sz="3200" dirty="0" err="1" smtClean="0"/>
@@ -5228,7 +5404,7 @@
             </a:r>
             <a:r>
               <a:rPr lang="en-US" sz="3200" dirty="0" smtClean="0"/>
-              <a:t> attached SSD, </a:t>
+              <a:t> attached SSD; </a:t>
             </a:r>
             <a:r>
               <a:rPr lang="en-US" sz="3200" dirty="0" err="1" smtClean="0"/>
@@ -5318,7 +5494,7 @@
         </p:nvSpPr>
         <p:spPr>
           <a:xfrm>
-            <a:off x="12158665" y="12120615"/>
+            <a:off x="12158665" y="11920590"/>
             <a:ext cx="19540535" cy="1100085"/>
           </a:xfrm>
           <a:prstGeom prst="rect">
@@ -5360,7 +5536,7 @@
             </a:r>
             <a:r>
               <a:rPr lang="en-US" sz="3200" dirty="0" smtClean="0"/>
-              <a:t> attached drives, the network will not be the IOPS bottleneck for remote transfers.</a:t>
+              <a:t> attached drives, the network stack will not be the IOPS bottleneck for remote transfers.</a:t>
             </a:r>
             <a:endParaRPr lang="en-US" sz="3200" b="1" dirty="0"/>
           </a:p>
@@ -5378,7 +5554,7 @@
         </p:nvSpPr>
         <p:spPr>
           <a:xfrm>
-            <a:off x="12272965" y="20197815"/>
+            <a:off x="12215815" y="20129654"/>
             <a:ext cx="19540535" cy="1100085"/>
           </a:xfrm>
           <a:prstGeom prst="rect">
@@ -5420,15 +5596,7 @@
             </a:r>
             <a:r>
               <a:rPr lang="en-US" sz="3200" dirty="0" smtClean="0"/>
-              <a:t>/s). Compared to the ~8.0 </a:t>
-            </a:r>
-            <a:r>
-              <a:rPr lang="en-US" sz="3200" dirty="0" err="1" smtClean="0"/>
-              <a:t>Gb</a:t>
-            </a:r>
-            <a:r>
-              <a:rPr lang="en-US" sz="3200" dirty="0" smtClean="0"/>
-              <a:t>/s transfer speeds of </a:t>
+              <a:t>/s). Compared to the ~8.0 Gb/s transfer speeds of </a:t>
             </a:r>
             <a:r>
               <a:rPr lang="en-US" sz="3200" dirty="0" err="1" smtClean="0"/>
@@ -5436,7 +5604,7 @@
             </a:r>
             <a:r>
               <a:rPr lang="en-US" sz="3200" dirty="0" smtClean="0"/>
-              <a:t> attached drives, the network will not be the throughput bottleneck for remote transfers.</a:t>
+              <a:t> attached drives, the network stack will not be the throughput bottleneck for remote transfers.</a:t>
             </a:r>
             <a:endParaRPr lang="en-US" sz="3200" b="1" dirty="0"/>
           </a:p>
@@ -5454,7 +5622,7 @@
         </p:nvSpPr>
         <p:spPr>
           <a:xfrm>
-            <a:off x="12158665" y="27741615"/>
+            <a:off x="12209465" y="27741615"/>
             <a:ext cx="19540535" cy="1100085"/>
           </a:xfrm>
           <a:prstGeom prst="rect">
@@ -5480,7 +5648,22 @@
             </a:r>
             <a:r>
               <a:rPr lang="en-US" sz="3200" dirty="0" smtClean="0"/>
-              <a:t>: Latency was higher than we were expecting. If we continued on with this project, this would be a primary point of investigation.</a:t>
+              <a:t>: For the tested block sizes and IO depths, </a:t>
+            </a:r>
+            <a:r>
+              <a:rPr lang="en-US" sz="3200" dirty="0" err="1" smtClean="0"/>
+              <a:t>nbdX</a:t>
+            </a:r>
+            <a:r>
+              <a:rPr lang="en-US" sz="3200" dirty="0" smtClean="0"/>
+              <a:t> performed within the expected latency range </a:t>
+            </a:r>
+            <a:br>
+              <a:rPr lang="en-US" sz="3200" dirty="0" smtClean="0"/>
+            </a:br>
+            <a:r>
+              <a:rPr lang="en-US" sz="3200" dirty="0" smtClean="0"/>
+              <a:t>of remote transfer protocols.</a:t>
             </a:r>
             <a:endParaRPr lang="en-US" sz="3200" b="1" dirty="0"/>
           </a:p>
@@ -5494,7 +5677,7 @@
         </p:nvSpPr>
         <p:spPr>
           <a:xfrm>
-            <a:off x="990600" y="15792450"/>
+            <a:off x="990600" y="15392400"/>
             <a:ext cx="9601200" cy="3046988"/>
           </a:xfrm>
           <a:prstGeom prst="rect">
@@ -5563,7 +5746,7 @@
         </p:nvSpPr>
         <p:spPr>
           <a:xfrm>
-            <a:off x="1104900" y="19716750"/>
+            <a:off x="1104900" y="19402425"/>
             <a:ext cx="9474708" cy="2554545"/>
           </a:xfrm>
           <a:prstGeom prst="rect">
@@ -5616,7 +5799,7 @@
         </p:nvSpPr>
         <p:spPr>
           <a:xfrm>
-            <a:off x="1219200" y="23193375"/>
+            <a:off x="1219200" y="22936200"/>
             <a:ext cx="9563100" cy="2062103"/>
           </a:xfrm>
           <a:prstGeom prst="rect">
@@ -5649,7 +5832,7 @@
         </p:nvSpPr>
         <p:spPr>
           <a:xfrm>
-            <a:off x="1219200" y="26165175"/>
+            <a:off x="1219200" y="26022300"/>
             <a:ext cx="9639300" cy="3539430"/>
           </a:xfrm>
           <a:prstGeom prst="rect">
@@ -5762,7 +5945,29 @@
             </a:pPr>
             <a:r>
               <a:rPr lang="en-US" sz="3200" dirty="0" smtClean="0"/>
-              <a:t>[1] SNIA Ethernet Storage Forum     	http://www.snia.org/sites/default/files/ESF/NVMe_	Under_Hood_12_15_Final2.pdf</a:t>
+              <a:t>[1] SNIA Ethernet Storage Forum     	</a:t>
+            </a:r>
+            <a:br>
+              <a:rPr lang="en-US" sz="3200" dirty="0" smtClean="0"/>
+            </a:br>
+            <a:r>
+              <a:rPr lang="en-US" sz="3200" dirty="0" smtClean="0"/>
+              <a:t>  http://www.snia.org/sites/default/files/ESF/</a:t>
+            </a:r>
+            <a:r>
+              <a:rPr lang="en-US" sz="3200" dirty="0" err="1" smtClean="0"/>
+              <a:t>NVMe</a:t>
+            </a:r>
+            <a:r>
+              <a:rPr lang="en-US" sz="3200" dirty="0" smtClean="0"/>
+              <a:t>_  </a:t>
+            </a:r>
+            <a:br>
+              <a:rPr lang="en-US" sz="3200" dirty="0" smtClean="0"/>
+            </a:br>
+            <a:r>
+              <a:rPr lang="en-US" sz="3200" dirty="0" smtClean="0"/>
+              <a:t>  Under_Hood_12_15_Final2.pdf</a:t>
             </a:r>
             <a:endParaRPr lang="en-US" sz="3200" dirty="0"/>
           </a:p>
@@ -5828,7 +6033,13 @@
         <p:nvGraphicFramePr>
           <p:cNvPr id="54" name="Chart 53"/>
           <p:cNvGraphicFramePr/>
-          <p:nvPr/>
+          <p:nvPr>
+            <p:extLst>
+              <p:ext uri="{D42A27DB-BD31-4B8C-83A1-F6EECF244321}">
+                <p14:modId xmlns:p14="http://schemas.microsoft.com/office/powerpoint/2010/main" val="4283470029"/>
+              </p:ext>
+            </p:extLst>
+          </p:nvPr>
         </p:nvGraphicFramePr>
         <p:xfrm>
           <a:off x="12336556" y="6627159"/>
@@ -5842,13 +6053,19 @@
       </p:graphicFrame>
       <p:graphicFrame>
         <p:nvGraphicFramePr>
-          <p:cNvPr id="63" name="Chart 62"/>
+          <p:cNvPr id="72" name="Chart 71"/>
           <p:cNvGraphicFramePr/>
-          <p:nvPr/>
+          <p:nvPr>
+            <p:extLst>
+              <p:ext uri="{D42A27DB-BD31-4B8C-83A1-F6EECF244321}">
+                <p14:modId xmlns:p14="http://schemas.microsoft.com/office/powerpoint/2010/main" val="1353453282"/>
+              </p:ext>
+            </p:extLst>
+          </p:nvPr>
         </p:nvGraphicFramePr>
         <p:xfrm>
-          <a:off x="12279404" y="21777511"/>
-          <a:ext cx="19257264" cy="6340289"/>
+          <a:off x="11915775" y="13412724"/>
+          <a:ext cx="19889837" cy="6931152"/>
         </p:xfrm>
         <a:graphic>
           <a:graphicData uri="http://schemas.openxmlformats.org/drawingml/2006/chart">
@@ -5858,13 +6075,19 @@
       </p:graphicFrame>
       <p:graphicFrame>
         <p:nvGraphicFramePr>
-          <p:cNvPr id="72" name="Chart 71"/>
+          <p:cNvPr id="55" name="Chart 54"/>
           <p:cNvGraphicFramePr/>
-          <p:nvPr/>
+          <p:nvPr>
+            <p:extLst>
+              <p:ext uri="{D42A27DB-BD31-4B8C-83A1-F6EECF244321}">
+                <p14:modId xmlns:p14="http://schemas.microsoft.com/office/powerpoint/2010/main" val="1740112295"/>
+              </p:ext>
+            </p:extLst>
+          </p:nvPr>
         </p:nvGraphicFramePr>
         <p:xfrm>
-          <a:off x="11915775" y="13444537"/>
-          <a:ext cx="19889837" cy="6931152"/>
+          <a:off x="12279404" y="21587010"/>
+          <a:ext cx="19257264" cy="6336792"/>
         </p:xfrm>
         <a:graphic>
           <a:graphicData uri="http://schemas.openxmlformats.org/drawingml/2006/chart">
@@ -5880,6 +6103,13 @@
   <p:transition spd="slow">
     <p:cut/>
   </p:transition>
+  <p:timing>
+    <p:tnLst>
+      <p:par>
+        <p:cTn id="1" dur="indefinite" restart="never" nodeType="tmRoot"/>
+      </p:par>
+    </p:tnLst>
+  </p:timing>
 </p:sld>
 </file>
 

</xml_diff>